<commit_message>
Fixed the architecture diagrams
Each had two AZ1s. Now each has an AZ1 and an AZ2.
</commit_message>
<xml_diff>
--- a/docs/images/AD-architecture-scenarios.pptx
+++ b/docs/images/AD-architecture-scenarios.pptx
@@ -243,7 +243,7 @@
           <a:p>
             <a:fld id="{5F225875-05B7-45BB-A1E2-9D73BEC1EB04}" type="datetimeFigureOut">
               <a:rPr lang="en-US" smtClean="0"/>
-              <a:t>4/5/2021</a:t>
+              <a:t>4/7/2021</a:t>
             </a:fld>
             <a:endParaRPr lang="en-US" dirty="0"/>
           </a:p>
@@ -411,7 +411,7 @@
           <a:p>
             <a:fld id="{5F225875-05B7-45BB-A1E2-9D73BEC1EB04}" type="datetimeFigureOut">
               <a:rPr lang="en-US" smtClean="0"/>
-              <a:t>4/5/2021</a:t>
+              <a:t>4/7/2021</a:t>
             </a:fld>
             <a:endParaRPr lang="en-US" dirty="0"/>
           </a:p>
@@ -589,7 +589,7 @@
           <a:p>
             <a:fld id="{5F225875-05B7-45BB-A1E2-9D73BEC1EB04}" type="datetimeFigureOut">
               <a:rPr lang="en-US" smtClean="0"/>
-              <a:t>4/5/2021</a:t>
+              <a:t>4/7/2021</a:t>
             </a:fld>
             <a:endParaRPr lang="en-US" dirty="0"/>
           </a:p>
@@ -757,7 +757,7 @@
           <a:p>
             <a:fld id="{5F225875-05B7-45BB-A1E2-9D73BEC1EB04}" type="datetimeFigureOut">
               <a:rPr lang="en-US" smtClean="0"/>
-              <a:t>4/5/2021</a:t>
+              <a:t>4/7/2021</a:t>
             </a:fld>
             <a:endParaRPr lang="en-US" dirty="0"/>
           </a:p>
@@ -1002,7 +1002,7 @@
           <a:p>
             <a:fld id="{5F225875-05B7-45BB-A1E2-9D73BEC1EB04}" type="datetimeFigureOut">
               <a:rPr lang="en-US" smtClean="0"/>
-              <a:t>4/5/2021</a:t>
+              <a:t>4/7/2021</a:t>
             </a:fld>
             <a:endParaRPr lang="en-US" dirty="0"/>
           </a:p>
@@ -1231,7 +1231,7 @@
           <a:p>
             <a:fld id="{5F225875-05B7-45BB-A1E2-9D73BEC1EB04}" type="datetimeFigureOut">
               <a:rPr lang="en-US" smtClean="0"/>
-              <a:t>4/5/2021</a:t>
+              <a:t>4/7/2021</a:t>
             </a:fld>
             <a:endParaRPr lang="en-US" dirty="0"/>
           </a:p>
@@ -1595,7 +1595,7 @@
           <a:p>
             <a:fld id="{5F225875-05B7-45BB-A1E2-9D73BEC1EB04}" type="datetimeFigureOut">
               <a:rPr lang="en-US" smtClean="0"/>
-              <a:t>4/5/2021</a:t>
+              <a:t>4/7/2021</a:t>
             </a:fld>
             <a:endParaRPr lang="en-US" dirty="0"/>
           </a:p>
@@ -1712,7 +1712,7 @@
           <a:p>
             <a:fld id="{5F225875-05B7-45BB-A1E2-9D73BEC1EB04}" type="datetimeFigureOut">
               <a:rPr lang="en-US" smtClean="0"/>
-              <a:t>4/5/2021</a:t>
+              <a:t>4/7/2021</a:t>
             </a:fld>
             <a:endParaRPr lang="en-US" dirty="0"/>
           </a:p>
@@ -1807,7 +1807,7 @@
           <a:p>
             <a:fld id="{5F225875-05B7-45BB-A1E2-9D73BEC1EB04}" type="datetimeFigureOut">
               <a:rPr lang="en-US" smtClean="0"/>
-              <a:t>4/5/2021</a:t>
+              <a:t>4/7/2021</a:t>
             </a:fld>
             <a:endParaRPr lang="en-US" dirty="0"/>
           </a:p>
@@ -2082,7 +2082,7 @@
           <a:p>
             <a:fld id="{5F225875-05B7-45BB-A1E2-9D73BEC1EB04}" type="datetimeFigureOut">
               <a:rPr lang="en-US" smtClean="0"/>
-              <a:t>4/5/2021</a:t>
+              <a:t>4/7/2021</a:t>
             </a:fld>
             <a:endParaRPr lang="en-US" dirty="0"/>
           </a:p>
@@ -2334,7 +2334,7 @@
           <a:p>
             <a:fld id="{5F225875-05B7-45BB-A1E2-9D73BEC1EB04}" type="datetimeFigureOut">
               <a:rPr lang="en-US" smtClean="0"/>
-              <a:t>4/5/2021</a:t>
+              <a:t>4/7/2021</a:t>
             </a:fld>
             <a:endParaRPr lang="en-US" dirty="0"/>
           </a:p>
@@ -2545,7 +2545,7 @@
           <a:p>
             <a:fld id="{5F225875-05B7-45BB-A1E2-9D73BEC1EB04}" type="datetimeFigureOut">
               <a:rPr lang="en-US" smtClean="0"/>
-              <a:t>4/5/2021</a:t>
+              <a:t>4/7/2021</a:t>
             </a:fld>
             <a:endParaRPr lang="en-US" dirty="0"/>
           </a:p>
@@ -3197,7 +3197,7 @@
           <a:blip r:embed="rId2">
             <a:extLst>
               <a:ext uri="{96DAC541-7B7A-43D3-8B79-37D633B846F1}">
-                <asvg:svgBlip xmlns:asvg="http://schemas.microsoft.com/office/drawing/2016/SVG/main" xmlns="" r:embed="rId3"/>
+                <asvg:svgBlip xmlns="" xmlns:asvg="http://schemas.microsoft.com/office/drawing/2016/SVG/main" r:embed="rId3"/>
               </a:ext>
             </a:extLst>
           </a:blip>
@@ -3313,7 +3313,7 @@
           <a:blip r:embed="rId4">
             <a:extLst>
               <a:ext uri="{96DAC541-7B7A-43D3-8B79-37D633B846F1}">
-                <asvg:svgBlip xmlns:asvg="http://schemas.microsoft.com/office/drawing/2016/SVG/main" xmlns="" r:embed="rId9"/>
+                <asvg:svgBlip xmlns="" xmlns:asvg="http://schemas.microsoft.com/office/drawing/2016/SVG/main" r:embed="rId9"/>
               </a:ext>
             </a:extLst>
           </a:blip>
@@ -3479,7 +3479,7 @@
           <a:blip r:embed="rId10">
             <a:extLst>
               <a:ext uri="{96DAC541-7B7A-43D3-8B79-37D633B846F1}">
-                <asvg:svgBlip xmlns:asvg="http://schemas.microsoft.com/office/drawing/2016/SVG/main" xmlns="" r:embed="rId11"/>
+                <asvg:svgBlip xmlns="" xmlns:asvg="http://schemas.microsoft.com/office/drawing/2016/SVG/main" r:embed="rId11"/>
               </a:ext>
             </a:extLst>
           </a:blip>
@@ -3515,7 +3515,7 @@
           <a:blip r:embed="rId12">
             <a:extLst>
               <a:ext uri="{96DAC541-7B7A-43D3-8B79-37D633B846F1}">
-                <asvg:svgBlip xmlns:asvg="http://schemas.microsoft.com/office/drawing/2016/SVG/main" xmlns="" r:embed="rId13"/>
+                <asvg:svgBlip xmlns="" xmlns:asvg="http://schemas.microsoft.com/office/drawing/2016/SVG/main" r:embed="rId13"/>
               </a:ext>
             </a:extLst>
           </a:blip>
@@ -3631,7 +3631,7 @@
           <a:blip r:embed="rId14">
             <a:extLst>
               <a:ext uri="{96DAC541-7B7A-43D3-8B79-37D633B846F1}">
-                <asvg:svgBlip xmlns:asvg="http://schemas.microsoft.com/office/drawing/2016/SVG/main" xmlns="" r:embed="rId17"/>
+                <asvg:svgBlip xmlns="" xmlns:asvg="http://schemas.microsoft.com/office/drawing/2016/SVG/main" r:embed="rId17"/>
               </a:ext>
             </a:extLst>
           </a:blip>
@@ -3667,7 +3667,7 @@
           <a:blip r:embed="rId12">
             <a:extLst>
               <a:ext uri="{96DAC541-7B7A-43D3-8B79-37D633B846F1}">
-                <asvg:svgBlip xmlns:asvg="http://schemas.microsoft.com/office/drawing/2016/SVG/main" xmlns="" r:embed="rId13"/>
+                <asvg:svgBlip xmlns="" xmlns:asvg="http://schemas.microsoft.com/office/drawing/2016/SVG/main" r:embed="rId13"/>
               </a:ext>
             </a:extLst>
           </a:blip>
@@ -3831,7 +3831,7 @@
           <a:blip r:embed="rId4">
             <a:extLst>
               <a:ext uri="{96DAC541-7B7A-43D3-8B79-37D633B846F1}">
-                <asvg:svgBlip xmlns:asvg="http://schemas.microsoft.com/office/drawing/2016/SVG/main" xmlns="" r:embed="rId9"/>
+                <asvg:svgBlip xmlns="" xmlns:asvg="http://schemas.microsoft.com/office/drawing/2016/SVG/main" r:embed="rId9"/>
               </a:ext>
             </a:extLst>
           </a:blip>
@@ -3950,7 +3950,7 @@
           <a:blip r:embed="rId14">
             <a:extLst>
               <a:ext uri="{96DAC541-7B7A-43D3-8B79-37D633B846F1}">
-                <asvg:svgBlip xmlns:asvg="http://schemas.microsoft.com/office/drawing/2016/SVG/main" xmlns="" r:embed="rId17"/>
+                <asvg:svgBlip xmlns="" xmlns:asvg="http://schemas.microsoft.com/office/drawing/2016/SVG/main" r:embed="rId17"/>
               </a:ext>
             </a:extLst>
           </a:blip>
@@ -3986,7 +3986,7 @@
           <a:blip r:embed="rId12">
             <a:extLst>
               <a:ext uri="{96DAC541-7B7A-43D3-8B79-37D633B846F1}">
-                <asvg:svgBlip xmlns:asvg="http://schemas.microsoft.com/office/drawing/2016/SVG/main" xmlns="" r:embed="rId13"/>
+                <asvg:svgBlip xmlns="" xmlns:asvg="http://schemas.microsoft.com/office/drawing/2016/SVG/main" r:embed="rId13"/>
               </a:ext>
             </a:extLst>
           </a:blip>
@@ -4127,7 +4127,7 @@
           <a:blip r:embed="rId18">
             <a:extLst>
               <a:ext uri="{96DAC541-7B7A-43D3-8B79-37D633B846F1}">
-                <asvg:svgBlip xmlns:asvg="http://schemas.microsoft.com/office/drawing/2016/SVG/main" xmlns="" r:embed="rId29"/>
+                <asvg:svgBlip xmlns="" xmlns:asvg="http://schemas.microsoft.com/office/drawing/2016/SVG/main" r:embed="rId29"/>
               </a:ext>
             </a:extLst>
           </a:blip>
@@ -4172,7 +4172,7 @@
                 </a14:imgProps>
               </a:ext>
               <a:ext uri="{96DAC541-7B7A-43D3-8B79-37D633B846F1}">
-                <asvg:svgBlip xmlns:asvg="http://schemas.microsoft.com/office/drawing/2016/SVG/main" xmlns="" r:embed="rId32"/>
+                <asvg:svgBlip xmlns="" xmlns:asvg="http://schemas.microsoft.com/office/drawing/2016/SVG/main" r:embed="rId32"/>
               </a:ext>
             </a:extLst>
           </a:blip>
@@ -4724,7 +4724,17 @@
                 <a:latin typeface="Arial" panose="020B0604020202020204" pitchFamily="34" charset="0"/>
                 <a:cs typeface="Arial" panose="020B0604020202020204" pitchFamily="34" charset="0"/>
               </a:rPr>
-              <a:t>Zone 1</a:t>
+              <a:t>Zone </a:t>
+            </a:r>
+            <a:r>
+              <a:rPr lang="en-US" sz="1200" dirty="0" smtClean="0">
+                <a:solidFill>
+                  <a:srgbClr val="5B9CD5"/>
+                </a:solidFill>
+                <a:latin typeface="Arial" panose="020B0604020202020204" pitchFamily="34" charset="0"/>
+                <a:cs typeface="Arial" panose="020B0604020202020204" pitchFamily="34" charset="0"/>
+              </a:rPr>
+              <a:t>2</a:t>
             </a:r>
             <a:endParaRPr lang="en-US" sz="1200" dirty="0">
               <a:solidFill>
@@ -4754,7 +4764,7 @@
           <a:blip r:embed="rId35">
             <a:extLst>
               <a:ext uri="{96DAC541-7B7A-43D3-8B79-37D633B846F1}">
-                <asvg:svgBlip xmlns:asvg="http://schemas.microsoft.com/office/drawing/2016/SVG/main" xmlns="" r:embed="rId7"/>
+                <asvg:svgBlip xmlns="" xmlns:asvg="http://schemas.microsoft.com/office/drawing/2016/SVG/main" r:embed="rId7"/>
               </a:ext>
             </a:extLst>
           </a:blip>
@@ -4790,7 +4800,7 @@
           <a:blip r:embed="rId35">
             <a:extLst>
               <a:ext uri="{96DAC541-7B7A-43D3-8B79-37D633B846F1}">
-                <asvg:svgBlip xmlns:asvg="http://schemas.microsoft.com/office/drawing/2016/SVG/main" xmlns="" r:embed="rId7"/>
+                <asvg:svgBlip xmlns="" xmlns:asvg="http://schemas.microsoft.com/office/drawing/2016/SVG/main" r:embed="rId7"/>
               </a:ext>
             </a:extLst>
           </a:blip>
@@ -5130,7 +5140,7 @@
           <a:blip r:embed="rId2">
             <a:extLst>
               <a:ext uri="{96DAC541-7B7A-43D3-8B79-37D633B846F1}">
-                <asvg:svgBlip xmlns:asvg="http://schemas.microsoft.com/office/drawing/2016/SVG/main" xmlns="" r:embed="rId3"/>
+                <asvg:svgBlip xmlns="" xmlns:asvg="http://schemas.microsoft.com/office/drawing/2016/SVG/main" r:embed="rId3"/>
               </a:ext>
             </a:extLst>
           </a:blip>
@@ -5246,7 +5256,7 @@
           <a:blip r:embed="rId4">
             <a:extLst>
               <a:ext uri="{96DAC541-7B7A-43D3-8B79-37D633B846F1}">
-                <asvg:svgBlip xmlns:asvg="http://schemas.microsoft.com/office/drawing/2016/SVG/main" xmlns="" r:embed="rId9"/>
+                <asvg:svgBlip xmlns="" xmlns:asvg="http://schemas.microsoft.com/office/drawing/2016/SVG/main" r:embed="rId9"/>
               </a:ext>
             </a:extLst>
           </a:blip>
@@ -5412,7 +5422,7 @@
           <a:blip r:embed="rId10">
             <a:extLst>
               <a:ext uri="{96DAC541-7B7A-43D3-8B79-37D633B846F1}">
-                <asvg:svgBlip xmlns:asvg="http://schemas.microsoft.com/office/drawing/2016/SVG/main" xmlns="" r:embed="rId11"/>
+                <asvg:svgBlip xmlns="" xmlns:asvg="http://schemas.microsoft.com/office/drawing/2016/SVG/main" r:embed="rId11"/>
               </a:ext>
             </a:extLst>
           </a:blip>
@@ -5448,7 +5458,7 @@
           <a:blip r:embed="rId12">
             <a:extLst>
               <a:ext uri="{96DAC541-7B7A-43D3-8B79-37D633B846F1}">
-                <asvg:svgBlip xmlns:asvg="http://schemas.microsoft.com/office/drawing/2016/SVG/main" xmlns="" r:embed="rId13"/>
+                <asvg:svgBlip xmlns="" xmlns:asvg="http://schemas.microsoft.com/office/drawing/2016/SVG/main" r:embed="rId13"/>
               </a:ext>
             </a:extLst>
           </a:blip>
@@ -5564,7 +5574,7 @@
           <a:blip r:embed="rId14">
             <a:extLst>
               <a:ext uri="{96DAC541-7B7A-43D3-8B79-37D633B846F1}">
-                <asvg:svgBlip xmlns:asvg="http://schemas.microsoft.com/office/drawing/2016/SVG/main" xmlns="" r:embed="rId17"/>
+                <asvg:svgBlip xmlns="" xmlns:asvg="http://schemas.microsoft.com/office/drawing/2016/SVG/main" r:embed="rId17"/>
               </a:ext>
             </a:extLst>
           </a:blip>
@@ -5600,7 +5610,7 @@
           <a:blip r:embed="rId12">
             <a:extLst>
               <a:ext uri="{96DAC541-7B7A-43D3-8B79-37D633B846F1}">
-                <asvg:svgBlip xmlns:asvg="http://schemas.microsoft.com/office/drawing/2016/SVG/main" xmlns="" r:embed="rId13"/>
+                <asvg:svgBlip xmlns="" xmlns:asvg="http://schemas.microsoft.com/office/drawing/2016/SVG/main" r:embed="rId13"/>
               </a:ext>
             </a:extLst>
           </a:blip>
@@ -5764,7 +5774,7 @@
           <a:blip r:embed="rId4">
             <a:extLst>
               <a:ext uri="{96DAC541-7B7A-43D3-8B79-37D633B846F1}">
-                <asvg:svgBlip xmlns:asvg="http://schemas.microsoft.com/office/drawing/2016/SVG/main" xmlns="" r:embed="rId9"/>
+                <asvg:svgBlip xmlns="" xmlns:asvg="http://schemas.microsoft.com/office/drawing/2016/SVG/main" r:embed="rId9"/>
               </a:ext>
             </a:extLst>
           </a:blip>
@@ -5883,7 +5893,7 @@
           <a:blip r:embed="rId14">
             <a:extLst>
               <a:ext uri="{96DAC541-7B7A-43D3-8B79-37D633B846F1}">
-                <asvg:svgBlip xmlns:asvg="http://schemas.microsoft.com/office/drawing/2016/SVG/main" xmlns="" r:embed="rId17"/>
+                <asvg:svgBlip xmlns="" xmlns:asvg="http://schemas.microsoft.com/office/drawing/2016/SVG/main" r:embed="rId17"/>
               </a:ext>
             </a:extLst>
           </a:blip>
@@ -5919,7 +5929,7 @@
           <a:blip r:embed="rId12">
             <a:extLst>
               <a:ext uri="{96DAC541-7B7A-43D3-8B79-37D633B846F1}">
-                <asvg:svgBlip xmlns:asvg="http://schemas.microsoft.com/office/drawing/2016/SVG/main" xmlns="" r:embed="rId13"/>
+                <asvg:svgBlip xmlns="" xmlns:asvg="http://schemas.microsoft.com/office/drawing/2016/SVG/main" r:embed="rId13"/>
               </a:ext>
             </a:extLst>
           </a:blip>
@@ -6003,7 +6013,7 @@
           <a:blip r:embed="rId18">
             <a:extLst>
               <a:ext uri="{96DAC541-7B7A-43D3-8B79-37D633B846F1}">
-                <asvg:svgBlip xmlns:asvg="http://schemas.microsoft.com/office/drawing/2016/SVG/main" xmlns="" r:embed="rId29"/>
+                <asvg:svgBlip xmlns="" xmlns:asvg="http://schemas.microsoft.com/office/drawing/2016/SVG/main" r:embed="rId29"/>
               </a:ext>
             </a:extLst>
           </a:blip>
@@ -6048,7 +6058,7 @@
                 </a14:imgProps>
               </a:ext>
               <a:ext uri="{96DAC541-7B7A-43D3-8B79-37D633B846F1}">
-                <asvg:svgBlip xmlns:asvg="http://schemas.microsoft.com/office/drawing/2016/SVG/main" xmlns="" r:embed="rId32"/>
+                <asvg:svgBlip xmlns="" xmlns:asvg="http://schemas.microsoft.com/office/drawing/2016/SVG/main" r:embed="rId32"/>
               </a:ext>
             </a:extLst>
           </a:blip>
@@ -6418,7 +6428,17 @@
                 <a:latin typeface="Arial" panose="020B0604020202020204" pitchFamily="34" charset="0"/>
                 <a:cs typeface="Arial" panose="020B0604020202020204" pitchFamily="34" charset="0"/>
               </a:rPr>
-              <a:t>Zone 1</a:t>
+              <a:t>Zone </a:t>
+            </a:r>
+            <a:r>
+              <a:rPr lang="en-US" sz="1200" dirty="0" smtClean="0">
+                <a:solidFill>
+                  <a:srgbClr val="5B9CD5"/>
+                </a:solidFill>
+                <a:latin typeface="Arial" panose="020B0604020202020204" pitchFamily="34" charset="0"/>
+                <a:cs typeface="Arial" panose="020B0604020202020204" pitchFamily="34" charset="0"/>
+              </a:rPr>
+              <a:t>2</a:t>
             </a:r>
             <a:endParaRPr lang="en-US" sz="1200" dirty="0">
               <a:solidFill>
@@ -7997,7 +8017,7 @@
           <a:blip r:embed="rId40">
             <a:extLst>
               <a:ext uri="{96DAC541-7B7A-43D3-8B79-37D633B846F1}">
-                <asvg:svgBlip xmlns:asvg="http://schemas.microsoft.com/office/drawing/2016/SVG/main" xmlns="" r:embed="rId7"/>
+                <asvg:svgBlip xmlns="" xmlns:asvg="http://schemas.microsoft.com/office/drawing/2016/SVG/main" r:embed="rId7"/>
               </a:ext>
             </a:extLst>
           </a:blip>
@@ -8033,7 +8053,7 @@
           <a:blip r:embed="rId40">
             <a:extLst>
               <a:ext uri="{96DAC541-7B7A-43D3-8B79-37D633B846F1}">
-                <asvg:svgBlip xmlns:asvg="http://schemas.microsoft.com/office/drawing/2016/SVG/main" xmlns="" r:embed="rId7"/>
+                <asvg:svgBlip xmlns="" xmlns:asvg="http://schemas.microsoft.com/office/drawing/2016/SVG/main" r:embed="rId7"/>
               </a:ext>
             </a:extLst>
           </a:blip>
@@ -8373,7 +8393,7 @@
           <a:blip r:embed="rId2">
             <a:extLst>
               <a:ext uri="{96DAC541-7B7A-43D3-8B79-37D633B846F1}">
-                <asvg:svgBlip xmlns:asvg="http://schemas.microsoft.com/office/drawing/2016/SVG/main" xmlns="" r:embed="rId3"/>
+                <asvg:svgBlip xmlns="" xmlns:asvg="http://schemas.microsoft.com/office/drawing/2016/SVG/main" r:embed="rId3"/>
               </a:ext>
             </a:extLst>
           </a:blip>
@@ -8409,7 +8429,7 @@
           <a:blip r:embed="rId4">
             <a:extLst>
               <a:ext uri="{96DAC541-7B7A-43D3-8B79-37D633B846F1}">
-                <asvg:svgBlip xmlns:asvg="http://schemas.microsoft.com/office/drawing/2016/SVG/main" xmlns="" r:embed="rId7"/>
+                <asvg:svgBlip xmlns="" xmlns:asvg="http://schemas.microsoft.com/office/drawing/2016/SVG/main" r:embed="rId7"/>
               </a:ext>
             </a:extLst>
           </a:blip>
@@ -8525,7 +8545,7 @@
           <a:blip r:embed="rId8">
             <a:extLst>
               <a:ext uri="{96DAC541-7B7A-43D3-8B79-37D633B846F1}">
-                <asvg:svgBlip xmlns:asvg="http://schemas.microsoft.com/office/drawing/2016/SVG/main" xmlns="" r:embed="rId9"/>
+                <asvg:svgBlip xmlns="" xmlns:asvg="http://schemas.microsoft.com/office/drawing/2016/SVG/main" r:embed="rId9"/>
               </a:ext>
             </a:extLst>
           </a:blip>
@@ -8691,7 +8711,7 @@
           <a:blip r:embed="rId10">
             <a:extLst>
               <a:ext uri="{96DAC541-7B7A-43D3-8B79-37D633B846F1}">
-                <asvg:svgBlip xmlns:asvg="http://schemas.microsoft.com/office/drawing/2016/SVG/main" xmlns="" r:embed="rId11"/>
+                <asvg:svgBlip xmlns="" xmlns:asvg="http://schemas.microsoft.com/office/drawing/2016/SVG/main" r:embed="rId11"/>
               </a:ext>
             </a:extLst>
           </a:blip>
@@ -8727,7 +8747,7 @@
           <a:blip r:embed="rId12">
             <a:extLst>
               <a:ext uri="{96DAC541-7B7A-43D3-8B79-37D633B846F1}">
-                <asvg:svgBlip xmlns:asvg="http://schemas.microsoft.com/office/drawing/2016/SVG/main" xmlns="" r:embed="rId13"/>
+                <asvg:svgBlip xmlns="" xmlns:asvg="http://schemas.microsoft.com/office/drawing/2016/SVG/main" r:embed="rId13"/>
               </a:ext>
             </a:extLst>
           </a:blip>
@@ -8843,7 +8863,7 @@
           <a:blip r:embed="rId14">
             <a:extLst>
               <a:ext uri="{96DAC541-7B7A-43D3-8B79-37D633B846F1}">
-                <asvg:svgBlip xmlns:asvg="http://schemas.microsoft.com/office/drawing/2016/SVG/main" xmlns="" r:embed="rId17"/>
+                <asvg:svgBlip xmlns="" xmlns:asvg="http://schemas.microsoft.com/office/drawing/2016/SVG/main" r:embed="rId17"/>
               </a:ext>
             </a:extLst>
           </a:blip>
@@ -8879,7 +8899,7 @@
           <a:blip r:embed="rId12">
             <a:extLst>
               <a:ext uri="{96DAC541-7B7A-43D3-8B79-37D633B846F1}">
-                <asvg:svgBlip xmlns:asvg="http://schemas.microsoft.com/office/drawing/2016/SVG/main" xmlns="" r:embed="rId13"/>
+                <asvg:svgBlip xmlns="" xmlns:asvg="http://schemas.microsoft.com/office/drawing/2016/SVG/main" r:embed="rId13"/>
               </a:ext>
             </a:extLst>
           </a:blip>
@@ -8932,15 +8952,7 @@
                 <a:ea typeface="Amazon Ember" panose="020B0603020204020204" pitchFamily="34" charset="0"/>
                 <a:cs typeface="Arial" panose="020B0604020202020204" pitchFamily="34" charset="0"/>
               </a:rPr>
-              <a:t>Management </a:t>
-            </a:r>
-            <a:r>
-              <a:rPr lang="en-US" sz="1200" dirty="0" smtClean="0">
-                <a:latin typeface="Arial" panose="020B0604020202020204" pitchFamily="34" charset="0"/>
-                <a:ea typeface="Amazon Ember" panose="020B0603020204020204" pitchFamily="34" charset="0"/>
-                <a:cs typeface="Arial" panose="020B0604020202020204" pitchFamily="34" charset="0"/>
-              </a:rPr>
-              <a:t>instance</a:t>
+              <a:t>Management instance</a:t>
             </a:r>
             <a:br>
               <a:rPr lang="en-US" sz="1200" dirty="0" smtClean="0">
@@ -8983,7 +8995,7 @@
           <a:blip r:embed="rId4">
             <a:extLst>
               <a:ext uri="{96DAC541-7B7A-43D3-8B79-37D633B846F1}">
-                <asvg:svgBlip xmlns:asvg="http://schemas.microsoft.com/office/drawing/2016/SVG/main" xmlns="" r:embed="rId7"/>
+                <asvg:svgBlip xmlns="" xmlns:asvg="http://schemas.microsoft.com/office/drawing/2016/SVG/main" r:embed="rId7"/>
               </a:ext>
             </a:extLst>
           </a:blip>
@@ -9099,7 +9111,7 @@
           <a:blip r:embed="rId8">
             <a:extLst>
               <a:ext uri="{96DAC541-7B7A-43D3-8B79-37D633B846F1}">
-                <asvg:svgBlip xmlns:asvg="http://schemas.microsoft.com/office/drawing/2016/SVG/main" xmlns="" r:embed="rId9"/>
+                <asvg:svgBlip xmlns="" xmlns:asvg="http://schemas.microsoft.com/office/drawing/2016/SVG/main" r:embed="rId9"/>
               </a:ext>
             </a:extLst>
           </a:blip>
@@ -9218,7 +9230,7 @@
           <a:blip r:embed="rId14">
             <a:extLst>
               <a:ext uri="{96DAC541-7B7A-43D3-8B79-37D633B846F1}">
-                <asvg:svgBlip xmlns:asvg="http://schemas.microsoft.com/office/drawing/2016/SVG/main" xmlns="" r:embed="rId17"/>
+                <asvg:svgBlip xmlns="" xmlns:asvg="http://schemas.microsoft.com/office/drawing/2016/SVG/main" r:embed="rId17"/>
               </a:ext>
             </a:extLst>
           </a:blip>
@@ -9311,7 +9323,7 @@
           <a:blip r:embed="rId18">
             <a:extLst>
               <a:ext uri="{96DAC541-7B7A-43D3-8B79-37D633B846F1}">
-                <asvg:svgBlip xmlns:asvg="http://schemas.microsoft.com/office/drawing/2016/SVG/main" xmlns="" r:embed="rId29"/>
+                <asvg:svgBlip xmlns="" xmlns:asvg="http://schemas.microsoft.com/office/drawing/2016/SVG/main" r:embed="rId29"/>
               </a:ext>
             </a:extLst>
           </a:blip>
@@ -9356,7 +9368,7 @@
                 </a14:imgProps>
               </a:ext>
               <a:ext uri="{96DAC541-7B7A-43D3-8B79-37D633B846F1}">
-                <asvg:svgBlip xmlns:asvg="http://schemas.microsoft.com/office/drawing/2016/SVG/main" xmlns="" r:embed="rId32"/>
+                <asvg:svgBlip xmlns="" xmlns:asvg="http://schemas.microsoft.com/office/drawing/2016/SVG/main" r:embed="rId32"/>
               </a:ext>
             </a:extLst>
           </a:blip>
@@ -9908,7 +9920,17 @@
                 <a:latin typeface="Arial" panose="020B0604020202020204" pitchFamily="34" charset="0"/>
                 <a:cs typeface="Arial" panose="020B0604020202020204" pitchFamily="34" charset="0"/>
               </a:rPr>
-              <a:t>Zone 1</a:t>
+              <a:t>Zone </a:t>
+            </a:r>
+            <a:r>
+              <a:rPr lang="en-US" sz="1200" dirty="0" smtClean="0">
+                <a:solidFill>
+                  <a:srgbClr val="5B9CD5"/>
+                </a:solidFill>
+                <a:latin typeface="Arial" panose="020B0604020202020204" pitchFamily="34" charset="0"/>
+                <a:cs typeface="Arial" panose="020B0604020202020204" pitchFamily="34" charset="0"/>
+              </a:rPr>
+              <a:t>2</a:t>
             </a:r>
             <a:endParaRPr lang="en-US" sz="1200" dirty="0">
               <a:solidFill>

</xml_diff>

<commit_message>
Production doc builds - 2021/04/08 02:53:44 UTC
</commit_message>
<xml_diff>
--- a/docs/images/AD-architecture-scenarios.pptx
+++ b/docs/images/AD-architecture-scenarios.pptx
@@ -243,7 +243,7 @@
           <a:p>
             <a:fld id="{5F225875-05B7-45BB-A1E2-9D73BEC1EB04}" type="datetimeFigureOut">
               <a:rPr lang="en-US" smtClean="0"/>
-              <a:t>4/5/2021</a:t>
+              <a:t>4/7/2021</a:t>
             </a:fld>
             <a:endParaRPr lang="en-US" dirty="0"/>
           </a:p>
@@ -411,7 +411,7 @@
           <a:p>
             <a:fld id="{5F225875-05B7-45BB-A1E2-9D73BEC1EB04}" type="datetimeFigureOut">
               <a:rPr lang="en-US" smtClean="0"/>
-              <a:t>4/5/2021</a:t>
+              <a:t>4/7/2021</a:t>
             </a:fld>
             <a:endParaRPr lang="en-US" dirty="0"/>
           </a:p>
@@ -589,7 +589,7 @@
           <a:p>
             <a:fld id="{5F225875-05B7-45BB-A1E2-9D73BEC1EB04}" type="datetimeFigureOut">
               <a:rPr lang="en-US" smtClean="0"/>
-              <a:t>4/5/2021</a:t>
+              <a:t>4/7/2021</a:t>
             </a:fld>
             <a:endParaRPr lang="en-US" dirty="0"/>
           </a:p>
@@ -757,7 +757,7 @@
           <a:p>
             <a:fld id="{5F225875-05B7-45BB-A1E2-9D73BEC1EB04}" type="datetimeFigureOut">
               <a:rPr lang="en-US" smtClean="0"/>
-              <a:t>4/5/2021</a:t>
+              <a:t>4/7/2021</a:t>
             </a:fld>
             <a:endParaRPr lang="en-US" dirty="0"/>
           </a:p>
@@ -1002,7 +1002,7 @@
           <a:p>
             <a:fld id="{5F225875-05B7-45BB-A1E2-9D73BEC1EB04}" type="datetimeFigureOut">
               <a:rPr lang="en-US" smtClean="0"/>
-              <a:t>4/5/2021</a:t>
+              <a:t>4/7/2021</a:t>
             </a:fld>
             <a:endParaRPr lang="en-US" dirty="0"/>
           </a:p>
@@ -1231,7 +1231,7 @@
           <a:p>
             <a:fld id="{5F225875-05B7-45BB-A1E2-9D73BEC1EB04}" type="datetimeFigureOut">
               <a:rPr lang="en-US" smtClean="0"/>
-              <a:t>4/5/2021</a:t>
+              <a:t>4/7/2021</a:t>
             </a:fld>
             <a:endParaRPr lang="en-US" dirty="0"/>
           </a:p>
@@ -1595,7 +1595,7 @@
           <a:p>
             <a:fld id="{5F225875-05B7-45BB-A1E2-9D73BEC1EB04}" type="datetimeFigureOut">
               <a:rPr lang="en-US" smtClean="0"/>
-              <a:t>4/5/2021</a:t>
+              <a:t>4/7/2021</a:t>
             </a:fld>
             <a:endParaRPr lang="en-US" dirty="0"/>
           </a:p>
@@ -1712,7 +1712,7 @@
           <a:p>
             <a:fld id="{5F225875-05B7-45BB-A1E2-9D73BEC1EB04}" type="datetimeFigureOut">
               <a:rPr lang="en-US" smtClean="0"/>
-              <a:t>4/5/2021</a:t>
+              <a:t>4/7/2021</a:t>
             </a:fld>
             <a:endParaRPr lang="en-US" dirty="0"/>
           </a:p>
@@ -1807,7 +1807,7 @@
           <a:p>
             <a:fld id="{5F225875-05B7-45BB-A1E2-9D73BEC1EB04}" type="datetimeFigureOut">
               <a:rPr lang="en-US" smtClean="0"/>
-              <a:t>4/5/2021</a:t>
+              <a:t>4/7/2021</a:t>
             </a:fld>
             <a:endParaRPr lang="en-US" dirty="0"/>
           </a:p>
@@ -2082,7 +2082,7 @@
           <a:p>
             <a:fld id="{5F225875-05B7-45BB-A1E2-9D73BEC1EB04}" type="datetimeFigureOut">
               <a:rPr lang="en-US" smtClean="0"/>
-              <a:t>4/5/2021</a:t>
+              <a:t>4/7/2021</a:t>
             </a:fld>
             <a:endParaRPr lang="en-US" dirty="0"/>
           </a:p>
@@ -2334,7 +2334,7 @@
           <a:p>
             <a:fld id="{5F225875-05B7-45BB-A1E2-9D73BEC1EB04}" type="datetimeFigureOut">
               <a:rPr lang="en-US" smtClean="0"/>
-              <a:t>4/5/2021</a:t>
+              <a:t>4/7/2021</a:t>
             </a:fld>
             <a:endParaRPr lang="en-US" dirty="0"/>
           </a:p>
@@ -2545,7 +2545,7 @@
           <a:p>
             <a:fld id="{5F225875-05B7-45BB-A1E2-9D73BEC1EB04}" type="datetimeFigureOut">
               <a:rPr lang="en-US" smtClean="0"/>
-              <a:t>4/5/2021</a:t>
+              <a:t>4/7/2021</a:t>
             </a:fld>
             <a:endParaRPr lang="en-US" dirty="0"/>
           </a:p>
@@ -3197,7 +3197,7 @@
           <a:blip r:embed="rId2">
             <a:extLst>
               <a:ext uri="{96DAC541-7B7A-43D3-8B79-37D633B846F1}">
-                <asvg:svgBlip xmlns:asvg="http://schemas.microsoft.com/office/drawing/2016/SVG/main" xmlns="" r:embed="rId3"/>
+                <asvg:svgBlip xmlns="" xmlns:asvg="http://schemas.microsoft.com/office/drawing/2016/SVG/main" r:embed="rId3"/>
               </a:ext>
             </a:extLst>
           </a:blip>
@@ -3313,7 +3313,7 @@
           <a:blip r:embed="rId4">
             <a:extLst>
               <a:ext uri="{96DAC541-7B7A-43D3-8B79-37D633B846F1}">
-                <asvg:svgBlip xmlns:asvg="http://schemas.microsoft.com/office/drawing/2016/SVG/main" xmlns="" r:embed="rId9"/>
+                <asvg:svgBlip xmlns="" xmlns:asvg="http://schemas.microsoft.com/office/drawing/2016/SVG/main" r:embed="rId9"/>
               </a:ext>
             </a:extLst>
           </a:blip>
@@ -3479,7 +3479,7 @@
           <a:blip r:embed="rId10">
             <a:extLst>
               <a:ext uri="{96DAC541-7B7A-43D3-8B79-37D633B846F1}">
-                <asvg:svgBlip xmlns:asvg="http://schemas.microsoft.com/office/drawing/2016/SVG/main" xmlns="" r:embed="rId11"/>
+                <asvg:svgBlip xmlns="" xmlns:asvg="http://schemas.microsoft.com/office/drawing/2016/SVG/main" r:embed="rId11"/>
               </a:ext>
             </a:extLst>
           </a:blip>
@@ -3515,7 +3515,7 @@
           <a:blip r:embed="rId12">
             <a:extLst>
               <a:ext uri="{96DAC541-7B7A-43D3-8B79-37D633B846F1}">
-                <asvg:svgBlip xmlns:asvg="http://schemas.microsoft.com/office/drawing/2016/SVG/main" xmlns="" r:embed="rId13"/>
+                <asvg:svgBlip xmlns="" xmlns:asvg="http://schemas.microsoft.com/office/drawing/2016/SVG/main" r:embed="rId13"/>
               </a:ext>
             </a:extLst>
           </a:blip>
@@ -3631,7 +3631,7 @@
           <a:blip r:embed="rId14">
             <a:extLst>
               <a:ext uri="{96DAC541-7B7A-43D3-8B79-37D633B846F1}">
-                <asvg:svgBlip xmlns:asvg="http://schemas.microsoft.com/office/drawing/2016/SVG/main" xmlns="" r:embed="rId17"/>
+                <asvg:svgBlip xmlns="" xmlns:asvg="http://schemas.microsoft.com/office/drawing/2016/SVG/main" r:embed="rId17"/>
               </a:ext>
             </a:extLst>
           </a:blip>
@@ -3667,7 +3667,7 @@
           <a:blip r:embed="rId12">
             <a:extLst>
               <a:ext uri="{96DAC541-7B7A-43D3-8B79-37D633B846F1}">
-                <asvg:svgBlip xmlns:asvg="http://schemas.microsoft.com/office/drawing/2016/SVG/main" xmlns="" r:embed="rId13"/>
+                <asvg:svgBlip xmlns="" xmlns:asvg="http://schemas.microsoft.com/office/drawing/2016/SVG/main" r:embed="rId13"/>
               </a:ext>
             </a:extLst>
           </a:blip>
@@ -3831,7 +3831,7 @@
           <a:blip r:embed="rId4">
             <a:extLst>
               <a:ext uri="{96DAC541-7B7A-43D3-8B79-37D633B846F1}">
-                <asvg:svgBlip xmlns:asvg="http://schemas.microsoft.com/office/drawing/2016/SVG/main" xmlns="" r:embed="rId9"/>
+                <asvg:svgBlip xmlns="" xmlns:asvg="http://schemas.microsoft.com/office/drawing/2016/SVG/main" r:embed="rId9"/>
               </a:ext>
             </a:extLst>
           </a:blip>
@@ -3950,7 +3950,7 @@
           <a:blip r:embed="rId14">
             <a:extLst>
               <a:ext uri="{96DAC541-7B7A-43D3-8B79-37D633B846F1}">
-                <asvg:svgBlip xmlns:asvg="http://schemas.microsoft.com/office/drawing/2016/SVG/main" xmlns="" r:embed="rId17"/>
+                <asvg:svgBlip xmlns="" xmlns:asvg="http://schemas.microsoft.com/office/drawing/2016/SVG/main" r:embed="rId17"/>
               </a:ext>
             </a:extLst>
           </a:blip>
@@ -3986,7 +3986,7 @@
           <a:blip r:embed="rId12">
             <a:extLst>
               <a:ext uri="{96DAC541-7B7A-43D3-8B79-37D633B846F1}">
-                <asvg:svgBlip xmlns:asvg="http://schemas.microsoft.com/office/drawing/2016/SVG/main" xmlns="" r:embed="rId13"/>
+                <asvg:svgBlip xmlns="" xmlns:asvg="http://schemas.microsoft.com/office/drawing/2016/SVG/main" r:embed="rId13"/>
               </a:ext>
             </a:extLst>
           </a:blip>
@@ -4127,7 +4127,7 @@
           <a:blip r:embed="rId18">
             <a:extLst>
               <a:ext uri="{96DAC541-7B7A-43D3-8B79-37D633B846F1}">
-                <asvg:svgBlip xmlns:asvg="http://schemas.microsoft.com/office/drawing/2016/SVG/main" xmlns="" r:embed="rId29"/>
+                <asvg:svgBlip xmlns="" xmlns:asvg="http://schemas.microsoft.com/office/drawing/2016/SVG/main" r:embed="rId29"/>
               </a:ext>
             </a:extLst>
           </a:blip>
@@ -4172,7 +4172,7 @@
                 </a14:imgProps>
               </a:ext>
               <a:ext uri="{96DAC541-7B7A-43D3-8B79-37D633B846F1}">
-                <asvg:svgBlip xmlns:asvg="http://schemas.microsoft.com/office/drawing/2016/SVG/main" xmlns="" r:embed="rId32"/>
+                <asvg:svgBlip xmlns="" xmlns:asvg="http://schemas.microsoft.com/office/drawing/2016/SVG/main" r:embed="rId32"/>
               </a:ext>
             </a:extLst>
           </a:blip>
@@ -4724,7 +4724,17 @@
                 <a:latin typeface="Arial" panose="020B0604020202020204" pitchFamily="34" charset="0"/>
                 <a:cs typeface="Arial" panose="020B0604020202020204" pitchFamily="34" charset="0"/>
               </a:rPr>
-              <a:t>Zone 1</a:t>
+              <a:t>Zone </a:t>
+            </a:r>
+            <a:r>
+              <a:rPr lang="en-US" sz="1200" dirty="0" smtClean="0">
+                <a:solidFill>
+                  <a:srgbClr val="5B9CD5"/>
+                </a:solidFill>
+                <a:latin typeface="Arial" panose="020B0604020202020204" pitchFamily="34" charset="0"/>
+                <a:cs typeface="Arial" panose="020B0604020202020204" pitchFamily="34" charset="0"/>
+              </a:rPr>
+              <a:t>2</a:t>
             </a:r>
             <a:endParaRPr lang="en-US" sz="1200" dirty="0">
               <a:solidFill>
@@ -4754,7 +4764,7 @@
           <a:blip r:embed="rId35">
             <a:extLst>
               <a:ext uri="{96DAC541-7B7A-43D3-8B79-37D633B846F1}">
-                <asvg:svgBlip xmlns:asvg="http://schemas.microsoft.com/office/drawing/2016/SVG/main" xmlns="" r:embed="rId7"/>
+                <asvg:svgBlip xmlns="" xmlns:asvg="http://schemas.microsoft.com/office/drawing/2016/SVG/main" r:embed="rId7"/>
               </a:ext>
             </a:extLst>
           </a:blip>
@@ -4790,7 +4800,7 @@
           <a:blip r:embed="rId35">
             <a:extLst>
               <a:ext uri="{96DAC541-7B7A-43D3-8B79-37D633B846F1}">
-                <asvg:svgBlip xmlns:asvg="http://schemas.microsoft.com/office/drawing/2016/SVG/main" xmlns="" r:embed="rId7"/>
+                <asvg:svgBlip xmlns="" xmlns:asvg="http://schemas.microsoft.com/office/drawing/2016/SVG/main" r:embed="rId7"/>
               </a:ext>
             </a:extLst>
           </a:blip>
@@ -5130,7 +5140,7 @@
           <a:blip r:embed="rId2">
             <a:extLst>
               <a:ext uri="{96DAC541-7B7A-43D3-8B79-37D633B846F1}">
-                <asvg:svgBlip xmlns:asvg="http://schemas.microsoft.com/office/drawing/2016/SVG/main" xmlns="" r:embed="rId3"/>
+                <asvg:svgBlip xmlns="" xmlns:asvg="http://schemas.microsoft.com/office/drawing/2016/SVG/main" r:embed="rId3"/>
               </a:ext>
             </a:extLst>
           </a:blip>
@@ -5246,7 +5256,7 @@
           <a:blip r:embed="rId4">
             <a:extLst>
               <a:ext uri="{96DAC541-7B7A-43D3-8B79-37D633B846F1}">
-                <asvg:svgBlip xmlns:asvg="http://schemas.microsoft.com/office/drawing/2016/SVG/main" xmlns="" r:embed="rId9"/>
+                <asvg:svgBlip xmlns="" xmlns:asvg="http://schemas.microsoft.com/office/drawing/2016/SVG/main" r:embed="rId9"/>
               </a:ext>
             </a:extLst>
           </a:blip>
@@ -5412,7 +5422,7 @@
           <a:blip r:embed="rId10">
             <a:extLst>
               <a:ext uri="{96DAC541-7B7A-43D3-8B79-37D633B846F1}">
-                <asvg:svgBlip xmlns:asvg="http://schemas.microsoft.com/office/drawing/2016/SVG/main" xmlns="" r:embed="rId11"/>
+                <asvg:svgBlip xmlns="" xmlns:asvg="http://schemas.microsoft.com/office/drawing/2016/SVG/main" r:embed="rId11"/>
               </a:ext>
             </a:extLst>
           </a:blip>
@@ -5448,7 +5458,7 @@
           <a:blip r:embed="rId12">
             <a:extLst>
               <a:ext uri="{96DAC541-7B7A-43D3-8B79-37D633B846F1}">
-                <asvg:svgBlip xmlns:asvg="http://schemas.microsoft.com/office/drawing/2016/SVG/main" xmlns="" r:embed="rId13"/>
+                <asvg:svgBlip xmlns="" xmlns:asvg="http://schemas.microsoft.com/office/drawing/2016/SVG/main" r:embed="rId13"/>
               </a:ext>
             </a:extLst>
           </a:blip>
@@ -5564,7 +5574,7 @@
           <a:blip r:embed="rId14">
             <a:extLst>
               <a:ext uri="{96DAC541-7B7A-43D3-8B79-37D633B846F1}">
-                <asvg:svgBlip xmlns:asvg="http://schemas.microsoft.com/office/drawing/2016/SVG/main" xmlns="" r:embed="rId17"/>
+                <asvg:svgBlip xmlns="" xmlns:asvg="http://schemas.microsoft.com/office/drawing/2016/SVG/main" r:embed="rId17"/>
               </a:ext>
             </a:extLst>
           </a:blip>
@@ -5600,7 +5610,7 @@
           <a:blip r:embed="rId12">
             <a:extLst>
               <a:ext uri="{96DAC541-7B7A-43D3-8B79-37D633B846F1}">
-                <asvg:svgBlip xmlns:asvg="http://schemas.microsoft.com/office/drawing/2016/SVG/main" xmlns="" r:embed="rId13"/>
+                <asvg:svgBlip xmlns="" xmlns:asvg="http://schemas.microsoft.com/office/drawing/2016/SVG/main" r:embed="rId13"/>
               </a:ext>
             </a:extLst>
           </a:blip>
@@ -5764,7 +5774,7 @@
           <a:blip r:embed="rId4">
             <a:extLst>
               <a:ext uri="{96DAC541-7B7A-43D3-8B79-37D633B846F1}">
-                <asvg:svgBlip xmlns:asvg="http://schemas.microsoft.com/office/drawing/2016/SVG/main" xmlns="" r:embed="rId9"/>
+                <asvg:svgBlip xmlns="" xmlns:asvg="http://schemas.microsoft.com/office/drawing/2016/SVG/main" r:embed="rId9"/>
               </a:ext>
             </a:extLst>
           </a:blip>
@@ -5883,7 +5893,7 @@
           <a:blip r:embed="rId14">
             <a:extLst>
               <a:ext uri="{96DAC541-7B7A-43D3-8B79-37D633B846F1}">
-                <asvg:svgBlip xmlns:asvg="http://schemas.microsoft.com/office/drawing/2016/SVG/main" xmlns="" r:embed="rId17"/>
+                <asvg:svgBlip xmlns="" xmlns:asvg="http://schemas.microsoft.com/office/drawing/2016/SVG/main" r:embed="rId17"/>
               </a:ext>
             </a:extLst>
           </a:blip>
@@ -5919,7 +5929,7 @@
           <a:blip r:embed="rId12">
             <a:extLst>
               <a:ext uri="{96DAC541-7B7A-43D3-8B79-37D633B846F1}">
-                <asvg:svgBlip xmlns:asvg="http://schemas.microsoft.com/office/drawing/2016/SVG/main" xmlns="" r:embed="rId13"/>
+                <asvg:svgBlip xmlns="" xmlns:asvg="http://schemas.microsoft.com/office/drawing/2016/SVG/main" r:embed="rId13"/>
               </a:ext>
             </a:extLst>
           </a:blip>
@@ -6003,7 +6013,7 @@
           <a:blip r:embed="rId18">
             <a:extLst>
               <a:ext uri="{96DAC541-7B7A-43D3-8B79-37D633B846F1}">
-                <asvg:svgBlip xmlns:asvg="http://schemas.microsoft.com/office/drawing/2016/SVG/main" xmlns="" r:embed="rId29"/>
+                <asvg:svgBlip xmlns="" xmlns:asvg="http://schemas.microsoft.com/office/drawing/2016/SVG/main" r:embed="rId29"/>
               </a:ext>
             </a:extLst>
           </a:blip>
@@ -6048,7 +6058,7 @@
                 </a14:imgProps>
               </a:ext>
               <a:ext uri="{96DAC541-7B7A-43D3-8B79-37D633B846F1}">
-                <asvg:svgBlip xmlns:asvg="http://schemas.microsoft.com/office/drawing/2016/SVG/main" xmlns="" r:embed="rId32"/>
+                <asvg:svgBlip xmlns="" xmlns:asvg="http://schemas.microsoft.com/office/drawing/2016/SVG/main" r:embed="rId32"/>
               </a:ext>
             </a:extLst>
           </a:blip>
@@ -6418,7 +6428,17 @@
                 <a:latin typeface="Arial" panose="020B0604020202020204" pitchFamily="34" charset="0"/>
                 <a:cs typeface="Arial" panose="020B0604020202020204" pitchFamily="34" charset="0"/>
               </a:rPr>
-              <a:t>Zone 1</a:t>
+              <a:t>Zone </a:t>
+            </a:r>
+            <a:r>
+              <a:rPr lang="en-US" sz="1200" dirty="0" smtClean="0">
+                <a:solidFill>
+                  <a:srgbClr val="5B9CD5"/>
+                </a:solidFill>
+                <a:latin typeface="Arial" panose="020B0604020202020204" pitchFamily="34" charset="0"/>
+                <a:cs typeface="Arial" panose="020B0604020202020204" pitchFamily="34" charset="0"/>
+              </a:rPr>
+              <a:t>2</a:t>
             </a:r>
             <a:endParaRPr lang="en-US" sz="1200" dirty="0">
               <a:solidFill>
@@ -7997,7 +8017,7 @@
           <a:blip r:embed="rId40">
             <a:extLst>
               <a:ext uri="{96DAC541-7B7A-43D3-8B79-37D633B846F1}">
-                <asvg:svgBlip xmlns:asvg="http://schemas.microsoft.com/office/drawing/2016/SVG/main" xmlns="" r:embed="rId7"/>
+                <asvg:svgBlip xmlns="" xmlns:asvg="http://schemas.microsoft.com/office/drawing/2016/SVG/main" r:embed="rId7"/>
               </a:ext>
             </a:extLst>
           </a:blip>
@@ -8033,7 +8053,7 @@
           <a:blip r:embed="rId40">
             <a:extLst>
               <a:ext uri="{96DAC541-7B7A-43D3-8B79-37D633B846F1}">
-                <asvg:svgBlip xmlns:asvg="http://schemas.microsoft.com/office/drawing/2016/SVG/main" xmlns="" r:embed="rId7"/>
+                <asvg:svgBlip xmlns="" xmlns:asvg="http://schemas.microsoft.com/office/drawing/2016/SVG/main" r:embed="rId7"/>
               </a:ext>
             </a:extLst>
           </a:blip>
@@ -8373,7 +8393,7 @@
           <a:blip r:embed="rId2">
             <a:extLst>
               <a:ext uri="{96DAC541-7B7A-43D3-8B79-37D633B846F1}">
-                <asvg:svgBlip xmlns:asvg="http://schemas.microsoft.com/office/drawing/2016/SVG/main" xmlns="" r:embed="rId3"/>
+                <asvg:svgBlip xmlns="" xmlns:asvg="http://schemas.microsoft.com/office/drawing/2016/SVG/main" r:embed="rId3"/>
               </a:ext>
             </a:extLst>
           </a:blip>
@@ -8409,7 +8429,7 @@
           <a:blip r:embed="rId4">
             <a:extLst>
               <a:ext uri="{96DAC541-7B7A-43D3-8B79-37D633B846F1}">
-                <asvg:svgBlip xmlns:asvg="http://schemas.microsoft.com/office/drawing/2016/SVG/main" xmlns="" r:embed="rId7"/>
+                <asvg:svgBlip xmlns="" xmlns:asvg="http://schemas.microsoft.com/office/drawing/2016/SVG/main" r:embed="rId7"/>
               </a:ext>
             </a:extLst>
           </a:blip>
@@ -8525,7 +8545,7 @@
           <a:blip r:embed="rId8">
             <a:extLst>
               <a:ext uri="{96DAC541-7B7A-43D3-8B79-37D633B846F1}">
-                <asvg:svgBlip xmlns:asvg="http://schemas.microsoft.com/office/drawing/2016/SVG/main" xmlns="" r:embed="rId9"/>
+                <asvg:svgBlip xmlns="" xmlns:asvg="http://schemas.microsoft.com/office/drawing/2016/SVG/main" r:embed="rId9"/>
               </a:ext>
             </a:extLst>
           </a:blip>
@@ -8691,7 +8711,7 @@
           <a:blip r:embed="rId10">
             <a:extLst>
               <a:ext uri="{96DAC541-7B7A-43D3-8B79-37D633B846F1}">
-                <asvg:svgBlip xmlns:asvg="http://schemas.microsoft.com/office/drawing/2016/SVG/main" xmlns="" r:embed="rId11"/>
+                <asvg:svgBlip xmlns="" xmlns:asvg="http://schemas.microsoft.com/office/drawing/2016/SVG/main" r:embed="rId11"/>
               </a:ext>
             </a:extLst>
           </a:blip>
@@ -8727,7 +8747,7 @@
           <a:blip r:embed="rId12">
             <a:extLst>
               <a:ext uri="{96DAC541-7B7A-43D3-8B79-37D633B846F1}">
-                <asvg:svgBlip xmlns:asvg="http://schemas.microsoft.com/office/drawing/2016/SVG/main" xmlns="" r:embed="rId13"/>
+                <asvg:svgBlip xmlns="" xmlns:asvg="http://schemas.microsoft.com/office/drawing/2016/SVG/main" r:embed="rId13"/>
               </a:ext>
             </a:extLst>
           </a:blip>
@@ -8843,7 +8863,7 @@
           <a:blip r:embed="rId14">
             <a:extLst>
               <a:ext uri="{96DAC541-7B7A-43D3-8B79-37D633B846F1}">
-                <asvg:svgBlip xmlns:asvg="http://schemas.microsoft.com/office/drawing/2016/SVG/main" xmlns="" r:embed="rId17"/>
+                <asvg:svgBlip xmlns="" xmlns:asvg="http://schemas.microsoft.com/office/drawing/2016/SVG/main" r:embed="rId17"/>
               </a:ext>
             </a:extLst>
           </a:blip>
@@ -8879,7 +8899,7 @@
           <a:blip r:embed="rId12">
             <a:extLst>
               <a:ext uri="{96DAC541-7B7A-43D3-8B79-37D633B846F1}">
-                <asvg:svgBlip xmlns:asvg="http://schemas.microsoft.com/office/drawing/2016/SVG/main" xmlns="" r:embed="rId13"/>
+                <asvg:svgBlip xmlns="" xmlns:asvg="http://schemas.microsoft.com/office/drawing/2016/SVG/main" r:embed="rId13"/>
               </a:ext>
             </a:extLst>
           </a:blip>
@@ -8932,15 +8952,7 @@
                 <a:ea typeface="Amazon Ember" panose="020B0603020204020204" pitchFamily="34" charset="0"/>
                 <a:cs typeface="Arial" panose="020B0604020202020204" pitchFamily="34" charset="0"/>
               </a:rPr>
-              <a:t>Management </a:t>
-            </a:r>
-            <a:r>
-              <a:rPr lang="en-US" sz="1200" dirty="0" smtClean="0">
-                <a:latin typeface="Arial" panose="020B0604020202020204" pitchFamily="34" charset="0"/>
-                <a:ea typeface="Amazon Ember" panose="020B0603020204020204" pitchFamily="34" charset="0"/>
-                <a:cs typeface="Arial" panose="020B0604020202020204" pitchFamily="34" charset="0"/>
-              </a:rPr>
-              <a:t>instance</a:t>
+              <a:t>Management instance</a:t>
             </a:r>
             <a:br>
               <a:rPr lang="en-US" sz="1200" dirty="0" smtClean="0">
@@ -8983,7 +8995,7 @@
           <a:blip r:embed="rId4">
             <a:extLst>
               <a:ext uri="{96DAC541-7B7A-43D3-8B79-37D633B846F1}">
-                <asvg:svgBlip xmlns:asvg="http://schemas.microsoft.com/office/drawing/2016/SVG/main" xmlns="" r:embed="rId7"/>
+                <asvg:svgBlip xmlns="" xmlns:asvg="http://schemas.microsoft.com/office/drawing/2016/SVG/main" r:embed="rId7"/>
               </a:ext>
             </a:extLst>
           </a:blip>
@@ -9099,7 +9111,7 @@
           <a:blip r:embed="rId8">
             <a:extLst>
               <a:ext uri="{96DAC541-7B7A-43D3-8B79-37D633B846F1}">
-                <asvg:svgBlip xmlns:asvg="http://schemas.microsoft.com/office/drawing/2016/SVG/main" xmlns="" r:embed="rId9"/>
+                <asvg:svgBlip xmlns="" xmlns:asvg="http://schemas.microsoft.com/office/drawing/2016/SVG/main" r:embed="rId9"/>
               </a:ext>
             </a:extLst>
           </a:blip>
@@ -9218,7 +9230,7 @@
           <a:blip r:embed="rId14">
             <a:extLst>
               <a:ext uri="{96DAC541-7B7A-43D3-8B79-37D633B846F1}">
-                <asvg:svgBlip xmlns:asvg="http://schemas.microsoft.com/office/drawing/2016/SVG/main" xmlns="" r:embed="rId17"/>
+                <asvg:svgBlip xmlns="" xmlns:asvg="http://schemas.microsoft.com/office/drawing/2016/SVG/main" r:embed="rId17"/>
               </a:ext>
             </a:extLst>
           </a:blip>
@@ -9311,7 +9323,7 @@
           <a:blip r:embed="rId18">
             <a:extLst>
               <a:ext uri="{96DAC541-7B7A-43D3-8B79-37D633B846F1}">
-                <asvg:svgBlip xmlns:asvg="http://schemas.microsoft.com/office/drawing/2016/SVG/main" xmlns="" r:embed="rId29"/>
+                <asvg:svgBlip xmlns="" xmlns:asvg="http://schemas.microsoft.com/office/drawing/2016/SVG/main" r:embed="rId29"/>
               </a:ext>
             </a:extLst>
           </a:blip>
@@ -9356,7 +9368,7 @@
                 </a14:imgProps>
               </a:ext>
               <a:ext uri="{96DAC541-7B7A-43D3-8B79-37D633B846F1}">
-                <asvg:svgBlip xmlns:asvg="http://schemas.microsoft.com/office/drawing/2016/SVG/main" xmlns="" r:embed="rId32"/>
+                <asvg:svgBlip xmlns="" xmlns:asvg="http://schemas.microsoft.com/office/drawing/2016/SVG/main" r:embed="rId32"/>
               </a:ext>
             </a:extLst>
           </a:blip>
@@ -9908,7 +9920,17 @@
                 <a:latin typeface="Arial" panose="020B0604020202020204" pitchFamily="34" charset="0"/>
                 <a:cs typeface="Arial" panose="020B0604020202020204" pitchFamily="34" charset="0"/>
               </a:rPr>
-              <a:t>Zone 1</a:t>
+              <a:t>Zone </a:t>
+            </a:r>
+            <a:r>
+              <a:rPr lang="en-US" sz="1200" dirty="0" smtClean="0">
+                <a:solidFill>
+                  <a:srgbClr val="5B9CD5"/>
+                </a:solidFill>
+                <a:latin typeface="Arial" panose="020B0604020202020204" pitchFamily="34" charset="0"/>
+                <a:cs typeface="Arial" panose="020B0604020202020204" pitchFamily="34" charset="0"/>
+              </a:rPr>
+              <a:t>2</a:t>
             </a:r>
             <a:endParaRPr lang="en-US" sz="1200" dirty="0">
               <a:solidFill>

</xml_diff>